<commit_message>
Corrigido endereco para instruções de configuracao do banco de dados
</commit_message>
<xml_diff>
--- a/Aula_JDBC_basico/Template padrão de apresentação.pptx
+++ b/Aula_JDBC_basico/Template padrão de apresentação.pptx
@@ -24193,7 +24193,7 @@
               <a:buSzPts val="2400"/>
             </a:pPr>
             <a:r>
-              <a:rPr lang="pt-BR" sz="1600" dirty="0">
+              <a:rPr lang="pt-BR" sz="1400" dirty="0">
                 <a:solidFill>
                   <a:srgbClr val="073763"/>
                 </a:solidFill>
@@ -24202,7 +24202,7 @@
                 <a:cs typeface="Proxima Nova"/>
                 <a:sym typeface="Proxima Nova"/>
               </a:rPr>
-              <a:t>https://github.com/danielkv7/digital-innovation-one/blob/master/jdbc-basico/src/main/java/part1/DatabaseInstructions</a:t>
+              <a:t>https://github.com/danielkv7/digital-innovation-one/blob/master/Aula_JDBC_basico/jdbc-basico/src/main/java/part1/DatabaseInstructions</a:t>
             </a:r>
           </a:p>
         </p:txBody>

</xml_diff>

<commit_message>
Atualizacao da URL do Github
</commit_message>
<xml_diff>
--- a/Aula_JDBC_basico/Template padrão de apresentação.pptx
+++ b/Aula_JDBC_basico/Template padrão de apresentação.pptx
@@ -21780,27 +21780,8 @@
                 <a:cs typeface="Proxima Nova"/>
                 <a:sym typeface="Proxima Nova"/>
               </a:rPr>
-              <a:t>https://github.com/danielkv7/digital-innovation-one/tree/master/jdbc-basico</a:t>
-            </a:r>
-          </a:p>
-          <a:p>
-            <a:pPr marL="419100" algn="l">
-              <a:buClr>
-                <a:srgbClr val="073763"/>
-              </a:buClr>
-              <a:buSzPts val="2400"/>
-              <a:buFont typeface="Wingdings" panose="05000000000000000000" pitchFamily="2" charset="2"/>
-              <a:buChar char="Ø"/>
-            </a:pPr>
-            <a:endParaRPr lang="pt-BR" sz="2400" dirty="0">
-              <a:solidFill>
-                <a:srgbClr val="073763"/>
-              </a:solidFill>
-              <a:latin typeface="Century Gothic" panose="020B0502020202020204" pitchFamily="34" charset="0"/>
-              <a:ea typeface="Proxima Nova"/>
-              <a:cs typeface="Proxima Nova"/>
-              <a:sym typeface="Proxima Nova"/>
-            </a:endParaRPr>
+              <a:t>https://github.com/danielkv7/digital-innovation-one/tree/master/Aula_JDBC_basico</a:t>
+            </a:r>
           </a:p>
         </p:txBody>
       </p:sp>

</xml_diff>